<commit_message>
CloudCom presentation 1st draft
</commit_message>
<xml_diff>
--- a/Eager/paper/cloudcom15/sla_durability_v1.pptx
+++ b/Eager/paper/cloudcom15/sla_durability_v1.pptx
@@ -23,6 +23,10 @@
     <p:sldId id="272" r:id="rId17"/>
     <p:sldId id="273" r:id="rId18"/>
     <p:sldId id="274" r:id="rId19"/>
+    <p:sldId id="275" r:id="rId20"/>
+    <p:sldId id="276" r:id="rId21"/>
+    <p:sldId id="277" r:id="rId22"/>
+    <p:sldId id="278" r:id="rId23"/>
   </p:sldIdLst>
   <p:sldSz cx="9144000" cy="6858000" type="screen4x3"/>
   <p:notesSz cx="6858000" cy="9144000"/>
@@ -305,7 +309,7 @@
           <a:p>
             <a:fld id="{1CC29EAC-1AD4-E94B-9CA1-65682E386A5F}" type="datetimeFigureOut">
               <a:rPr lang="en-US" smtClean="0"/>
-              <a:t>11/22/15</a:t>
+              <a:t>11/23/15</a:t>
             </a:fld>
             <a:endParaRPr lang="en-US"/>
           </a:p>
@@ -475,7 +479,7 @@
           <a:p>
             <a:fld id="{1CC29EAC-1AD4-E94B-9CA1-65682E386A5F}" type="datetimeFigureOut">
               <a:rPr lang="en-US" smtClean="0"/>
-              <a:t>11/22/15</a:t>
+              <a:t>11/23/15</a:t>
             </a:fld>
             <a:endParaRPr lang="en-US"/>
           </a:p>
@@ -655,7 +659,7 @@
           <a:p>
             <a:fld id="{1CC29EAC-1AD4-E94B-9CA1-65682E386A5F}" type="datetimeFigureOut">
               <a:rPr lang="en-US" smtClean="0"/>
-              <a:t>11/22/15</a:t>
+              <a:t>11/23/15</a:t>
             </a:fld>
             <a:endParaRPr lang="en-US"/>
           </a:p>
@@ -825,7 +829,7 @@
           <a:p>
             <a:fld id="{1CC29EAC-1AD4-E94B-9CA1-65682E386A5F}" type="datetimeFigureOut">
               <a:rPr lang="en-US" smtClean="0"/>
-              <a:t>11/22/15</a:t>
+              <a:t>11/23/15</a:t>
             </a:fld>
             <a:endParaRPr lang="en-US"/>
           </a:p>
@@ -1071,7 +1075,7 @@
           <a:p>
             <a:fld id="{1CC29EAC-1AD4-E94B-9CA1-65682E386A5F}" type="datetimeFigureOut">
               <a:rPr lang="en-US" smtClean="0"/>
-              <a:t>11/22/15</a:t>
+              <a:t>11/23/15</a:t>
             </a:fld>
             <a:endParaRPr lang="en-US"/>
           </a:p>
@@ -1359,7 +1363,7 @@
           <a:p>
             <a:fld id="{1CC29EAC-1AD4-E94B-9CA1-65682E386A5F}" type="datetimeFigureOut">
               <a:rPr lang="en-US" smtClean="0"/>
-              <a:t>11/22/15</a:t>
+              <a:t>11/23/15</a:t>
             </a:fld>
             <a:endParaRPr lang="en-US"/>
           </a:p>
@@ -1781,7 +1785,7 @@
           <a:p>
             <a:fld id="{1CC29EAC-1AD4-E94B-9CA1-65682E386A5F}" type="datetimeFigureOut">
               <a:rPr lang="en-US" smtClean="0"/>
-              <a:t>11/22/15</a:t>
+              <a:t>11/23/15</a:t>
             </a:fld>
             <a:endParaRPr lang="en-US"/>
           </a:p>
@@ -1899,7 +1903,7 @@
           <a:p>
             <a:fld id="{1CC29EAC-1AD4-E94B-9CA1-65682E386A5F}" type="datetimeFigureOut">
               <a:rPr lang="en-US" smtClean="0"/>
-              <a:t>11/22/15</a:t>
+              <a:t>11/23/15</a:t>
             </a:fld>
             <a:endParaRPr lang="en-US"/>
           </a:p>
@@ -1994,7 +1998,7 @@
           <a:p>
             <a:fld id="{1CC29EAC-1AD4-E94B-9CA1-65682E386A5F}" type="datetimeFigureOut">
               <a:rPr lang="en-US" smtClean="0"/>
-              <a:t>11/22/15</a:t>
+              <a:t>11/23/15</a:t>
             </a:fld>
             <a:endParaRPr lang="en-US"/>
           </a:p>
@@ -2271,7 +2275,7 @@
           <a:p>
             <a:fld id="{1CC29EAC-1AD4-E94B-9CA1-65682E386A5F}" type="datetimeFigureOut">
               <a:rPr lang="en-US" smtClean="0"/>
-              <a:t>11/22/15</a:t>
+              <a:t>11/23/15</a:t>
             </a:fld>
             <a:endParaRPr lang="en-US"/>
           </a:p>
@@ -2524,7 +2528,7 @@
           <a:p>
             <a:fld id="{1CC29EAC-1AD4-E94B-9CA1-65682E386A5F}" type="datetimeFigureOut">
               <a:rPr lang="en-US" smtClean="0"/>
-              <a:t>11/22/15</a:t>
+              <a:t>11/23/15</a:t>
             </a:fld>
             <a:endParaRPr lang="en-US"/>
           </a:p>
@@ -2737,7 +2741,7 @@
           <a:p>
             <a:fld id="{1CC29EAC-1AD4-E94B-9CA1-65682E386A5F}" type="datetimeFigureOut">
               <a:rPr lang="en-US" smtClean="0"/>
-              <a:t>11/22/15</a:t>
+              <a:t>11/23/15</a:t>
             </a:fld>
             <a:endParaRPr lang="en-US"/>
           </a:p>
@@ -3131,11 +3135,7 @@
           <a:p>
             <a:r>
               <a:rPr lang="en-US" b="1" dirty="0" smtClean="0"/>
-              <a:t>Service-Level Agreement Durability for Web Servic</a:t>
-            </a:r>
-            <a:r>
-              <a:rPr lang="en-US" b="1" dirty="0" smtClean="0"/>
-              <a:t>e Response Time</a:t>
+              <a:t>Service-Level Agreement Durability for Web Service Response Time</a:t>
             </a:r>
             <a:endParaRPr lang="en-US" b="1" dirty="0"/>
           </a:p>
@@ -3205,11 +3205,7 @@
             </a:r>
             <a:r>
               <a:rPr lang="en-US" sz="2400" dirty="0" smtClean="0"/>
-              <a:t> </a:t>
-            </a:r>
-            <a:r>
-              <a:rPr lang="en-US" sz="2400" dirty="0" smtClean="0"/>
-              <a:t>2015</a:t>
+              <a:t> 2015</a:t>
             </a:r>
             <a:endParaRPr lang="en-US" sz="2400" dirty="0"/>
           </a:p>
@@ -3340,8 +3336,15 @@
           <a:p>
             <a:r>
               <a:rPr lang="en-US" dirty="0" smtClean="0"/>
-              <a:t>Can we detect when a predicted SLA has become invalid in a given cloud platform?</a:t>
-            </a:r>
+              <a:t>Can we detect when a predicted SLA has become </a:t>
+            </a:r>
+            <a:r>
+              <a:rPr lang="en-US" dirty="0" smtClean="0"/>
+              <a:t>invalid?</a:t>
+            </a:r>
+          </a:p>
+          <a:p>
+            <a:endParaRPr lang="en-US" dirty="0" smtClean="0"/>
           </a:p>
           <a:p>
             <a:r>
@@ -6633,6 +6636,91 @@
 </p:sld>
 </file>
 
+<file path=ppt/slides/slide19.xml><?xml version="1.0" encoding="utf-8"?>
+<p:sld xmlns:a="http://schemas.openxmlformats.org/drawingml/2006/main" xmlns:r="http://schemas.openxmlformats.org/officeDocument/2006/relationships" xmlns:p="http://schemas.openxmlformats.org/presentationml/2006/main">
+  <p:cSld>
+    <p:spTree>
+      <p:nvGrpSpPr>
+        <p:cNvPr id="1" name=""/>
+        <p:cNvGrpSpPr/>
+        <p:nvPr/>
+      </p:nvGrpSpPr>
+      <p:grpSpPr>
+        <a:xfrm>
+          <a:off x="0" y="0"/>
+          <a:ext cx="0" cy="0"/>
+          <a:chOff x="0" y="0"/>
+          <a:chExt cx="0" cy="0"/>
+        </a:xfrm>
+      </p:grpSpPr>
+      <p:sp>
+        <p:nvSpPr>
+          <p:cNvPr id="2" name="Title 1"/>
+          <p:cNvSpPr>
+            <a:spLocks noGrp="1"/>
+          </p:cNvSpPr>
+          <p:nvPr>
+            <p:ph type="title"/>
+          </p:nvPr>
+        </p:nvSpPr>
+        <p:spPr/>
+        <p:txBody>
+          <a:bodyPr/>
+          <a:lstStyle/>
+          <a:p>
+            <a:r>
+              <a:rPr lang="en-US" dirty="0" smtClean="0"/>
+              <a:t>SLA Renewals Per User</a:t>
+            </a:r>
+            <a:endParaRPr lang="en-US" dirty="0"/>
+          </a:p>
+        </p:txBody>
+      </p:sp>
+      <p:pic>
+        <p:nvPicPr>
+          <p:cNvPr id="4" name="Content Placeholder 3" descr="renegotiation_cdf.png"/>
+          <p:cNvPicPr>
+            <a:picLocks noGrp="1" noChangeAspect="1"/>
+          </p:cNvPicPr>
+          <p:nvPr>
+            <p:ph idx="1"/>
+          </p:nvPr>
+        </p:nvPicPr>
+        <p:blipFill>
+          <a:blip r:embed="rId2">
+            <a:extLst>
+              <a:ext uri="{28A0092B-C50C-407E-A947-70E740481C1C}">
+                <a14:useLocalDpi xmlns:a14="http://schemas.microsoft.com/office/drawing/2010/main" val="0"/>
+              </a:ext>
+            </a:extLst>
+          </a:blip>
+          <a:srcRect l="-12238" r="-12238"/>
+          <a:stretch>
+            <a:fillRect/>
+          </a:stretch>
+        </p:blipFill>
+        <p:spPr/>
+      </p:pic>
+    </p:spTree>
+    <p:extLst>
+      <p:ext uri="{BB962C8B-B14F-4D97-AF65-F5344CB8AC3E}">
+        <p14:creationId xmlns:p14="http://schemas.microsoft.com/office/powerpoint/2010/main" val="3319717726"/>
+      </p:ext>
+    </p:extLst>
+  </p:cSld>
+  <p:clrMapOvr>
+    <a:masterClrMapping/>
+  </p:clrMapOvr>
+  <p:timing>
+    <p:tnLst>
+      <p:par>
+        <p:cTn xmlns:p14="http://schemas.microsoft.com/office/powerpoint/2010/main" id="1" dur="indefinite" restart="never" nodeType="tmRoot"/>
+      </p:par>
+    </p:tnLst>
+  </p:timing>
+</p:sld>
+</file>
+
 <file path=ppt/slides/slide2.xml><?xml version="1.0" encoding="utf-8"?>
 <p:sld xmlns:a="http://schemas.openxmlformats.org/drawingml/2006/main" xmlns:r="http://schemas.openxmlformats.org/officeDocument/2006/relationships" xmlns:p="http://schemas.openxmlformats.org/presentationml/2006/main">
   <p:cSld>
@@ -7193,6 +7281,874 @@
 </p:sld>
 </file>
 
+<file path=ppt/slides/slide20.xml><?xml version="1.0" encoding="utf-8"?>
+<p:sld xmlns:a="http://schemas.openxmlformats.org/drawingml/2006/main" xmlns:r="http://schemas.openxmlformats.org/officeDocument/2006/relationships" xmlns:p="http://schemas.openxmlformats.org/presentationml/2006/main">
+  <p:cSld>
+    <p:spTree>
+      <p:nvGrpSpPr>
+        <p:cNvPr id="1" name=""/>
+        <p:cNvGrpSpPr/>
+        <p:nvPr/>
+      </p:nvGrpSpPr>
+      <p:grpSpPr>
+        <a:xfrm>
+          <a:off x="0" y="0"/>
+          <a:ext cx="0" cy="0"/>
+          <a:chOff x="0" y="0"/>
+          <a:chExt cx="0" cy="0"/>
+        </a:xfrm>
+      </p:grpSpPr>
+      <p:sp>
+        <p:nvSpPr>
+          <p:cNvPr id="2" name="Title 1"/>
+          <p:cNvSpPr>
+            <a:spLocks noGrp="1"/>
+          </p:cNvSpPr>
+          <p:nvPr>
+            <p:ph type="title"/>
+          </p:nvPr>
+        </p:nvSpPr>
+        <p:spPr/>
+        <p:txBody>
+          <a:bodyPr/>
+          <a:lstStyle/>
+          <a:p>
+            <a:r>
+              <a:rPr lang="en-US" dirty="0" smtClean="0"/>
+              <a:t>SLA Validity Periods (In Hours)</a:t>
+            </a:r>
+            <a:endParaRPr lang="en-US" dirty="0"/>
+          </a:p>
+        </p:txBody>
+      </p:sp>
+      <p:graphicFrame>
+        <p:nvGraphicFramePr>
+          <p:cNvPr id="4" name="Content Placeholder 3"/>
+          <p:cNvGraphicFramePr>
+            <a:graphicFrameLocks noGrp="1"/>
+          </p:cNvGraphicFramePr>
+          <p:nvPr>
+            <p:ph idx="1"/>
+            <p:extLst>
+              <p:ext uri="{D42A27DB-BD31-4B8C-83A1-F6EECF244321}">
+                <p14:modId xmlns:p14="http://schemas.microsoft.com/office/powerpoint/2010/main" val="4268174944"/>
+              </p:ext>
+            </p:extLst>
+          </p:nvPr>
+        </p:nvGraphicFramePr>
+        <p:xfrm>
+          <a:off x="457200" y="1600200"/>
+          <a:ext cx="8229600" cy="2595880"/>
+        </p:xfrm>
+        <a:graphic>
+          <a:graphicData uri="http://schemas.openxmlformats.org/drawingml/2006/table">
+            <a:tbl>
+              <a:tblPr firstRow="1" bandRow="1">
+                <a:tableStyleId>{5C22544A-7EE6-4342-B048-85BDC9FD1C3A}</a:tableStyleId>
+              </a:tblPr>
+              <a:tblGrid>
+                <a:gridCol w="2624973"/>
+                <a:gridCol w="1918090"/>
+                <a:gridCol w="1878406"/>
+                <a:gridCol w="1808131"/>
+              </a:tblGrid>
+              <a:tr h="370840">
+                <a:tc>
+                  <a:txBody>
+                    <a:bodyPr/>
+                    <a:lstStyle/>
+                    <a:p>
+                      <a:pPr algn="ctr"/>
+                      <a:r>
+                        <a:rPr lang="en-US" dirty="0" smtClean="0"/>
+                        <a:t>API</a:t>
+                      </a:r>
+                      <a:endParaRPr lang="en-US" dirty="0"/>
+                    </a:p>
+                  </a:txBody>
+                  <a:tcPr/>
+                </a:tc>
+                <a:tc>
+                  <a:txBody>
+                    <a:bodyPr/>
+                    <a:lstStyle/>
+                    <a:p>
+                      <a:pPr algn="ctr"/>
+                      <a:r>
+                        <a:rPr lang="en-US" dirty="0" smtClean="0"/>
+                        <a:t>5</a:t>
+                      </a:r>
+                      <a:r>
+                        <a:rPr lang="en-US" baseline="30000" dirty="0" smtClean="0"/>
+                        <a:t>th</a:t>
+                      </a:r>
+                      <a:r>
+                        <a:rPr lang="en-US" dirty="0" smtClean="0"/>
+                        <a:t> Percentile</a:t>
+                      </a:r>
+                      <a:endParaRPr lang="en-US" dirty="0"/>
+                    </a:p>
+                  </a:txBody>
+                  <a:tcPr/>
+                </a:tc>
+                <a:tc>
+                  <a:txBody>
+                    <a:bodyPr/>
+                    <a:lstStyle/>
+                    <a:p>
+                      <a:pPr algn="ctr"/>
+                      <a:r>
+                        <a:rPr lang="en-US" dirty="0" smtClean="0"/>
+                        <a:t>Mean</a:t>
+                      </a:r>
+                      <a:endParaRPr lang="en-US" dirty="0"/>
+                    </a:p>
+                  </a:txBody>
+                  <a:tcPr/>
+                </a:tc>
+                <a:tc>
+                  <a:txBody>
+                    <a:bodyPr/>
+                    <a:lstStyle/>
+                    <a:p>
+                      <a:pPr algn="ctr"/>
+                      <a:r>
+                        <a:rPr lang="en-US" dirty="0" smtClean="0"/>
+                        <a:t>95</a:t>
+                      </a:r>
+                      <a:r>
+                        <a:rPr lang="en-US" baseline="30000" dirty="0" smtClean="0"/>
+                        <a:t>th</a:t>
+                      </a:r>
+                      <a:r>
+                        <a:rPr lang="en-US" dirty="0" smtClean="0"/>
+                        <a:t> Percentile</a:t>
+                      </a:r>
+                      <a:endParaRPr lang="en-US" dirty="0"/>
+                    </a:p>
+                  </a:txBody>
+                  <a:tcPr/>
+                </a:tc>
+              </a:tr>
+              <a:tr h="370840">
+                <a:tc>
+                  <a:txBody>
+                    <a:bodyPr/>
+                    <a:lstStyle/>
+                    <a:p>
+                      <a:pPr algn="l" fontAlgn="b"/>
+                      <a:r>
+                        <a:rPr lang="en-US" sz="1800" b="0" i="0" u="none" strike="noStrike" dirty="0" err="1">
+                          <a:solidFill>
+                            <a:srgbClr val="000000"/>
+                          </a:solidFill>
+                          <a:effectLst/>
+                          <a:latin typeface="Calibri"/>
+                        </a:rPr>
+                        <a:t>StudentInfo#getStudent</a:t>
+                      </a:r>
+                      <a:endParaRPr lang="en-US" sz="1800" b="0" i="0" u="none" strike="noStrike" dirty="0">
+                        <a:solidFill>
+                          <a:srgbClr val="000000"/>
+                        </a:solidFill>
+                        <a:effectLst/>
+                        <a:latin typeface="Calibri"/>
+                      </a:endParaRPr>
+                    </a:p>
+                  </a:txBody>
+                  <a:tcPr marL="12700" marR="12700" marT="12700" marB="0" anchor="b"/>
+                </a:tc>
+                <a:tc>
+                  <a:txBody>
+                    <a:bodyPr/>
+                    <a:lstStyle/>
+                    <a:p>
+                      <a:pPr algn="r" fontAlgn="b"/>
+                      <a:r>
+                        <a:rPr lang="en-US" sz="1800" b="0" i="0" u="none" strike="noStrike" dirty="0">
+                          <a:solidFill>
+                            <a:srgbClr val="000000"/>
+                          </a:solidFill>
+                          <a:effectLst/>
+                          <a:latin typeface="Calibri"/>
+                        </a:rPr>
+                        <a:t>12.97</a:t>
+                      </a:r>
+                    </a:p>
+                  </a:txBody>
+                  <a:tcPr marL="12700" marR="12700" marT="12700" marB="0" anchor="b"/>
+                </a:tc>
+                <a:tc>
+                  <a:txBody>
+                    <a:bodyPr/>
+                    <a:lstStyle/>
+                    <a:p>
+                      <a:pPr algn="r" fontAlgn="b"/>
+                      <a:r>
+                        <a:rPr lang="en-US" sz="1800" b="0" i="0" u="none" strike="noStrike" dirty="0">
+                          <a:solidFill>
+                            <a:srgbClr val="000000"/>
+                          </a:solidFill>
+                          <a:effectLst/>
+                          <a:latin typeface="Calibri"/>
+                        </a:rPr>
+                        <a:t>631.24</a:t>
+                      </a:r>
+                    </a:p>
+                  </a:txBody>
+                  <a:tcPr marL="12700" marR="12700" marT="12700" marB="0" anchor="b"/>
+                </a:tc>
+                <a:tc>
+                  <a:txBody>
+                    <a:bodyPr/>
+                    <a:lstStyle/>
+                    <a:p>
+                      <a:pPr algn="r" fontAlgn="b"/>
+                      <a:r>
+                        <a:rPr lang="en-US" sz="1800" b="0" i="0" u="none" strike="noStrike" dirty="0">
+                          <a:solidFill>
+                            <a:srgbClr val="000000"/>
+                          </a:solidFill>
+                          <a:effectLst/>
+                          <a:latin typeface="Calibri"/>
+                        </a:rPr>
+                        <a:t>1911.19</a:t>
+                      </a:r>
+                    </a:p>
+                  </a:txBody>
+                  <a:tcPr marL="12700" marR="12700" marT="12700" marB="0" anchor="b"/>
+                </a:tc>
+              </a:tr>
+              <a:tr h="370840">
+                <a:tc>
+                  <a:txBody>
+                    <a:bodyPr/>
+                    <a:lstStyle/>
+                    <a:p>
+                      <a:pPr algn="l" fontAlgn="b"/>
+                      <a:r>
+                        <a:rPr lang="en-US" sz="1800" b="0" i="0" u="none" strike="noStrike" dirty="0" err="1">
+                          <a:solidFill>
+                            <a:srgbClr val="000000"/>
+                          </a:solidFill>
+                          <a:effectLst/>
+                          <a:latin typeface="Calibri"/>
+                        </a:rPr>
+                        <a:t>StudentInfo#deleteStudent</a:t>
+                      </a:r>
+                      <a:endParaRPr lang="en-US" sz="1800" b="0" i="0" u="none" strike="noStrike" dirty="0">
+                        <a:solidFill>
+                          <a:srgbClr val="000000"/>
+                        </a:solidFill>
+                        <a:effectLst/>
+                        <a:latin typeface="Calibri"/>
+                      </a:endParaRPr>
+                    </a:p>
+                  </a:txBody>
+                  <a:tcPr marL="12700" marR="12700" marT="12700" marB="0" anchor="b"/>
+                </a:tc>
+                <a:tc>
+                  <a:txBody>
+                    <a:bodyPr/>
+                    <a:lstStyle/>
+                    <a:p>
+                      <a:pPr algn="r" fontAlgn="b"/>
+                      <a:r>
+                        <a:rPr lang="en-US" sz="1800" b="0" i="0" u="none" strike="noStrike" dirty="0">
+                          <a:solidFill>
+                            <a:srgbClr val="000000"/>
+                          </a:solidFill>
+                          <a:effectLst/>
+                          <a:latin typeface="Calibri"/>
+                        </a:rPr>
+                        <a:t>7.65</a:t>
+                      </a:r>
+                    </a:p>
+                  </a:txBody>
+                  <a:tcPr marL="12700" marR="12700" marT="12700" marB="0" anchor="b"/>
+                </a:tc>
+                <a:tc>
+                  <a:txBody>
+                    <a:bodyPr/>
+                    <a:lstStyle/>
+                    <a:p>
+                      <a:pPr algn="r" fontAlgn="b"/>
+                      <a:r>
+                        <a:rPr lang="en-US" sz="1800" b="0" i="0" u="none" strike="noStrike">
+                          <a:solidFill>
+                            <a:srgbClr val="000000"/>
+                          </a:solidFill>
+                          <a:effectLst/>
+                          <a:latin typeface="Calibri"/>
+                        </a:rPr>
+                        <a:t>472.07</a:t>
+                      </a:r>
+                    </a:p>
+                  </a:txBody>
+                  <a:tcPr marL="12700" marR="12700" marT="12700" marB="0" anchor="b"/>
+                </a:tc>
+                <a:tc>
+                  <a:txBody>
+                    <a:bodyPr/>
+                    <a:lstStyle/>
+                    <a:p>
+                      <a:pPr algn="r" fontAlgn="b"/>
+                      <a:r>
+                        <a:rPr lang="en-US" sz="1800" b="0" i="0" u="none" strike="noStrike">
+                          <a:solidFill>
+                            <a:srgbClr val="000000"/>
+                          </a:solidFill>
+                          <a:effectLst/>
+                          <a:latin typeface="Calibri"/>
+                        </a:rPr>
+                        <a:t>2031.59</a:t>
+                      </a:r>
+                    </a:p>
+                  </a:txBody>
+                  <a:tcPr marL="12700" marR="12700" marT="12700" marB="0" anchor="b"/>
+                </a:tc>
+              </a:tr>
+              <a:tr h="370840">
+                <a:tc>
+                  <a:txBody>
+                    <a:bodyPr/>
+                    <a:lstStyle/>
+                    <a:p>
+                      <a:pPr algn="l" fontAlgn="b"/>
+                      <a:r>
+                        <a:rPr lang="en-US" sz="1800" b="0" i="0" u="none" strike="noStrike" dirty="0" err="1">
+                          <a:solidFill>
+                            <a:srgbClr val="000000"/>
+                          </a:solidFill>
+                          <a:effectLst/>
+                          <a:latin typeface="Calibri"/>
+                        </a:rPr>
+                        <a:t>ServerHealth#info</a:t>
+                      </a:r>
+                      <a:endParaRPr lang="en-US" sz="1800" b="0" i="0" u="none" strike="noStrike" dirty="0">
+                        <a:solidFill>
+                          <a:srgbClr val="000000"/>
+                        </a:solidFill>
+                        <a:effectLst/>
+                        <a:latin typeface="Calibri"/>
+                      </a:endParaRPr>
+                    </a:p>
+                  </a:txBody>
+                  <a:tcPr marL="12700" marR="12700" marT="12700" marB="0" anchor="b"/>
+                </a:tc>
+                <a:tc>
+                  <a:txBody>
+                    <a:bodyPr/>
+                    <a:lstStyle/>
+                    <a:p>
+                      <a:pPr algn="r" fontAlgn="b"/>
+                      <a:r>
+                        <a:rPr lang="en-US" sz="1800" b="0" i="0" u="none" strike="noStrike" dirty="0">
+                          <a:solidFill>
+                            <a:srgbClr val="000000"/>
+                          </a:solidFill>
+                          <a:effectLst/>
+                          <a:latin typeface="Calibri"/>
+                        </a:rPr>
+                        <a:t>12.96</a:t>
+                      </a:r>
+                    </a:p>
+                  </a:txBody>
+                  <a:tcPr marL="12700" marR="12700" marT="12700" marB="0" anchor="b"/>
+                </a:tc>
+                <a:tc>
+                  <a:txBody>
+                    <a:bodyPr/>
+                    <a:lstStyle/>
+                    <a:p>
+                      <a:pPr algn="r" fontAlgn="b"/>
+                      <a:r>
+                        <a:rPr lang="en-US" sz="1800" b="0" i="0" u="none" strike="noStrike" dirty="0">
+                          <a:solidFill>
+                            <a:srgbClr val="000000"/>
+                          </a:solidFill>
+                          <a:effectLst/>
+                          <a:latin typeface="Calibri"/>
+                        </a:rPr>
+                        <a:t>630.01</a:t>
+                      </a:r>
+                    </a:p>
+                  </a:txBody>
+                  <a:tcPr marL="12700" marR="12700" marT="12700" marB="0" anchor="b"/>
+                </a:tc>
+                <a:tc>
+                  <a:txBody>
+                    <a:bodyPr/>
+                    <a:lstStyle/>
+                    <a:p>
+                      <a:pPr algn="r" fontAlgn="b"/>
+                      <a:r>
+                        <a:rPr lang="en-US" sz="1800" b="0" i="0" u="none" strike="noStrike">
+                          <a:solidFill>
+                            <a:srgbClr val="000000"/>
+                          </a:solidFill>
+                          <a:effectLst/>
+                          <a:latin typeface="Calibri"/>
+                        </a:rPr>
+                        <a:t>1911.19</a:t>
+                      </a:r>
+                    </a:p>
+                  </a:txBody>
+                  <a:tcPr marL="12700" marR="12700" marT="12700" marB="0" anchor="b"/>
+                </a:tc>
+              </a:tr>
+              <a:tr h="370840">
+                <a:tc>
+                  <a:txBody>
+                    <a:bodyPr/>
+                    <a:lstStyle/>
+                    <a:p>
+                      <a:pPr algn="l" fontAlgn="b"/>
+                      <a:r>
+                        <a:rPr lang="en-US" sz="1800" b="0" i="0" u="none" strike="noStrike">
+                          <a:solidFill>
+                            <a:srgbClr val="000000"/>
+                          </a:solidFill>
+                          <a:effectLst/>
+                          <a:latin typeface="Calibri"/>
+                        </a:rPr>
+                        <a:t>Rooms#getRoomByName</a:t>
+                      </a:r>
+                    </a:p>
+                  </a:txBody>
+                  <a:tcPr marL="12700" marR="12700" marT="12700" marB="0" anchor="b"/>
+                </a:tc>
+                <a:tc>
+                  <a:txBody>
+                    <a:bodyPr/>
+                    <a:lstStyle/>
+                    <a:p>
+                      <a:pPr algn="r" fontAlgn="b"/>
+                      <a:r>
+                        <a:rPr lang="en-US" sz="1800" b="0" i="0" u="none" strike="noStrike">
+                          <a:solidFill>
+                            <a:srgbClr val="000000"/>
+                          </a:solidFill>
+                          <a:effectLst/>
+                          <a:latin typeface="Calibri"/>
+                        </a:rPr>
+                        <a:t>8.48</a:t>
+                      </a:r>
+                    </a:p>
+                  </a:txBody>
+                  <a:tcPr marL="12700" marR="12700" marT="12700" marB="0" anchor="b"/>
+                </a:tc>
+                <a:tc>
+                  <a:txBody>
+                    <a:bodyPr/>
+                    <a:lstStyle/>
+                    <a:p>
+                      <a:pPr algn="r" fontAlgn="b"/>
+                      <a:r>
+                        <a:rPr lang="en-US" sz="1800" b="0" i="0" u="none" strike="noStrike" dirty="0">
+                          <a:solidFill>
+                            <a:srgbClr val="000000"/>
+                          </a:solidFill>
+                          <a:effectLst/>
+                          <a:latin typeface="Calibri"/>
+                        </a:rPr>
+                        <a:t>345.13</a:t>
+                      </a:r>
+                    </a:p>
+                  </a:txBody>
+                  <a:tcPr marL="12700" marR="12700" marT="12700" marB="0" anchor="b"/>
+                </a:tc>
+                <a:tc>
+                  <a:txBody>
+                    <a:bodyPr/>
+                    <a:lstStyle/>
+                    <a:p>
+                      <a:pPr algn="r" fontAlgn="b"/>
+                      <a:r>
+                        <a:rPr lang="en-US" sz="1800" b="0" i="0" u="none" strike="noStrike" dirty="0">
+                          <a:solidFill>
+                            <a:srgbClr val="000000"/>
+                          </a:solidFill>
+                          <a:effectLst/>
+                          <a:latin typeface="Calibri"/>
+                        </a:rPr>
+                        <a:t>1096.53</a:t>
+                      </a:r>
+                    </a:p>
+                  </a:txBody>
+                  <a:tcPr marL="12700" marR="12700" marT="12700" marB="0" anchor="b"/>
+                </a:tc>
+              </a:tr>
+              <a:tr h="370840">
+                <a:tc>
+                  <a:txBody>
+                    <a:bodyPr/>
+                    <a:lstStyle/>
+                    <a:p>
+                      <a:pPr algn="l" fontAlgn="b"/>
+                      <a:r>
+                        <a:rPr lang="en-US" sz="1800" b="0" i="0" u="none" strike="noStrike">
+                          <a:solidFill>
+                            <a:srgbClr val="000000"/>
+                          </a:solidFill>
+                          <a:effectLst/>
+                          <a:latin typeface="Calibri"/>
+                        </a:rPr>
+                        <a:t>Rooms#getRoomsInCity</a:t>
+                      </a:r>
+                    </a:p>
+                  </a:txBody>
+                  <a:tcPr marL="12700" marR="12700" marT="12700" marB="0" anchor="b"/>
+                </a:tc>
+                <a:tc>
+                  <a:txBody>
+                    <a:bodyPr/>
+                    <a:lstStyle/>
+                    <a:p>
+                      <a:pPr algn="r" fontAlgn="b"/>
+                      <a:r>
+                        <a:rPr lang="en-US" sz="1800" b="0" i="0" u="none" strike="noStrike">
+                          <a:solidFill>
+                            <a:srgbClr val="000000"/>
+                          </a:solidFill>
+                          <a:effectLst/>
+                          <a:latin typeface="Calibri"/>
+                        </a:rPr>
+                        <a:t>20.56</a:t>
+                      </a:r>
+                    </a:p>
+                  </a:txBody>
+                  <a:tcPr marL="12700" marR="12700" marT="12700" marB="0" anchor="b"/>
+                </a:tc>
+                <a:tc>
+                  <a:txBody>
+                    <a:bodyPr/>
+                    <a:lstStyle/>
+                    <a:p>
+                      <a:pPr algn="r" fontAlgn="b"/>
+                      <a:r>
+                        <a:rPr lang="en-US" sz="1800" b="0" i="0" u="none" strike="noStrike">
+                          <a:solidFill>
+                            <a:srgbClr val="000000"/>
+                          </a:solidFill>
+                          <a:effectLst/>
+                          <a:latin typeface="Calibri"/>
+                        </a:rPr>
+                        <a:t>296.44</a:t>
+                      </a:r>
+                    </a:p>
+                  </a:txBody>
+                  <a:tcPr marL="12700" marR="12700" marT="12700" marB="0" anchor="b"/>
+                </a:tc>
+                <a:tc>
+                  <a:txBody>
+                    <a:bodyPr/>
+                    <a:lstStyle/>
+                    <a:p>
+                      <a:pPr algn="r" fontAlgn="b"/>
+                      <a:r>
+                        <a:rPr lang="en-US" sz="1800" b="0" i="0" u="none" strike="noStrike" dirty="0">
+                          <a:solidFill>
+                            <a:srgbClr val="000000"/>
+                          </a:solidFill>
+                          <a:effectLst/>
+                          <a:latin typeface="Calibri"/>
+                        </a:rPr>
+                        <a:t>1143.45</a:t>
+                      </a:r>
+                    </a:p>
+                  </a:txBody>
+                  <a:tcPr marL="12700" marR="12700" marT="12700" marB="0" anchor="b"/>
+                </a:tc>
+              </a:tr>
+              <a:tr h="370840">
+                <a:tc>
+                  <a:txBody>
+                    <a:bodyPr/>
+                    <a:lstStyle/>
+                    <a:p>
+                      <a:pPr algn="l" fontAlgn="b"/>
+                      <a:r>
+                        <a:rPr lang="en-US" sz="1800" b="0" i="0" u="none" strike="noStrike" dirty="0" err="1">
+                          <a:solidFill>
+                            <a:srgbClr val="000000"/>
+                          </a:solidFill>
+                          <a:effectLst/>
+                          <a:latin typeface="Calibri"/>
+                        </a:rPr>
+                        <a:t>Stocks#buy</a:t>
+                      </a:r>
+                      <a:endParaRPr lang="en-US" sz="1800" b="0" i="0" u="none" strike="noStrike" dirty="0">
+                        <a:solidFill>
+                          <a:srgbClr val="000000"/>
+                        </a:solidFill>
+                        <a:effectLst/>
+                        <a:latin typeface="Calibri"/>
+                      </a:endParaRPr>
+                    </a:p>
+                  </a:txBody>
+                  <a:tcPr marL="12700" marR="12700" marT="12700" marB="0" anchor="b"/>
+                </a:tc>
+                <a:tc>
+                  <a:txBody>
+                    <a:bodyPr/>
+                    <a:lstStyle/>
+                    <a:p>
+                      <a:pPr algn="r" fontAlgn="b"/>
+                      <a:r>
+                        <a:rPr lang="en-US" sz="1800" b="0" i="0" u="none" strike="noStrike" dirty="0">
+                          <a:solidFill>
+                            <a:srgbClr val="000000"/>
+                          </a:solidFill>
+                          <a:effectLst/>
+                          <a:latin typeface="Calibri"/>
+                        </a:rPr>
+                        <a:t>8.46</a:t>
+                      </a:r>
+                    </a:p>
+                  </a:txBody>
+                  <a:tcPr marL="12700" marR="12700" marT="12700" marB="0" anchor="b"/>
+                </a:tc>
+                <a:tc>
+                  <a:txBody>
+                    <a:bodyPr/>
+                    <a:lstStyle/>
+                    <a:p>
+                      <a:pPr algn="r" fontAlgn="b"/>
+                      <a:r>
+                        <a:rPr lang="en-US" sz="1800" b="0" i="0" u="none" strike="noStrike" dirty="0">
+                          <a:solidFill>
+                            <a:srgbClr val="000000"/>
+                          </a:solidFill>
+                          <a:effectLst/>
+                          <a:latin typeface="Calibri"/>
+                        </a:rPr>
+                        <a:t>411.75</a:t>
+                      </a:r>
+                    </a:p>
+                  </a:txBody>
+                  <a:tcPr marL="12700" marR="12700" marT="12700" marB="0" anchor="b"/>
+                </a:tc>
+                <a:tc>
+                  <a:txBody>
+                    <a:bodyPr/>
+                    <a:lstStyle/>
+                    <a:p>
+                      <a:pPr algn="r" fontAlgn="b"/>
+                      <a:r>
+                        <a:rPr lang="en-US" sz="1800" b="0" i="0" u="none" strike="noStrike" dirty="0">
+                          <a:solidFill>
+                            <a:srgbClr val="000000"/>
+                          </a:solidFill>
+                          <a:effectLst/>
+                          <a:latin typeface="Calibri"/>
+                        </a:rPr>
+                        <a:t>815.5</a:t>
+                      </a:r>
+                    </a:p>
+                  </a:txBody>
+                  <a:tcPr marL="12700" marR="12700" marT="12700" marB="0" anchor="b"/>
+                </a:tc>
+              </a:tr>
+            </a:tbl>
+          </a:graphicData>
+        </a:graphic>
+      </p:graphicFrame>
+    </p:spTree>
+    <p:extLst>
+      <p:ext uri="{BB962C8B-B14F-4D97-AF65-F5344CB8AC3E}">
+        <p14:creationId xmlns:p14="http://schemas.microsoft.com/office/powerpoint/2010/main" val="1034290560"/>
+      </p:ext>
+    </p:extLst>
+  </p:cSld>
+  <p:clrMapOvr>
+    <a:masterClrMapping/>
+  </p:clrMapOvr>
+</p:sld>
+</file>
+
+<file path=ppt/slides/slide21.xml><?xml version="1.0" encoding="utf-8"?>
+<p:sld xmlns:a="http://schemas.openxmlformats.org/drawingml/2006/main" xmlns:r="http://schemas.openxmlformats.org/officeDocument/2006/relationships" xmlns:p="http://schemas.openxmlformats.org/presentationml/2006/main">
+  <p:cSld>
+    <p:spTree>
+      <p:nvGrpSpPr>
+        <p:cNvPr id="1" name=""/>
+        <p:cNvGrpSpPr/>
+        <p:nvPr/>
+      </p:nvGrpSpPr>
+      <p:grpSpPr>
+        <a:xfrm>
+          <a:off x="0" y="0"/>
+          <a:ext cx="0" cy="0"/>
+          <a:chOff x="0" y="0"/>
+          <a:chExt cx="0" cy="0"/>
+        </a:xfrm>
+      </p:grpSpPr>
+      <p:sp>
+        <p:nvSpPr>
+          <p:cNvPr id="2" name="Title 1"/>
+          <p:cNvSpPr>
+            <a:spLocks noGrp="1"/>
+          </p:cNvSpPr>
+          <p:nvPr>
+            <p:ph type="title"/>
+          </p:nvPr>
+        </p:nvSpPr>
+        <p:spPr/>
+        <p:txBody>
+          <a:bodyPr>
+            <a:normAutofit/>
+          </a:bodyPr>
+          <a:lstStyle/>
+          <a:p>
+            <a:r>
+              <a:rPr lang="en-US" dirty="0" smtClean="0"/>
+              <a:t>SLA Renewals (10% threshold)</a:t>
+            </a:r>
+            <a:endParaRPr lang="en-US" dirty="0"/>
+          </a:p>
+        </p:txBody>
+      </p:sp>
+      <p:pic>
+        <p:nvPicPr>
+          <p:cNvPr id="4" name="Content Placeholder 3" descr="renegotiation_cdf_sd10.png"/>
+          <p:cNvPicPr>
+            <a:picLocks noGrp="1" noChangeAspect="1"/>
+          </p:cNvPicPr>
+          <p:nvPr>
+            <p:ph idx="1"/>
+          </p:nvPr>
+        </p:nvPicPr>
+        <p:blipFill>
+          <a:blip r:embed="rId2">
+            <a:extLst>
+              <a:ext uri="{28A0092B-C50C-407E-A947-70E740481C1C}">
+                <a14:useLocalDpi xmlns:a14="http://schemas.microsoft.com/office/drawing/2010/main" val="0"/>
+              </a:ext>
+            </a:extLst>
+          </a:blip>
+          <a:srcRect l="-12238" r="-12238"/>
+          <a:stretch>
+            <a:fillRect/>
+          </a:stretch>
+        </p:blipFill>
+        <p:spPr/>
+      </p:pic>
+    </p:spTree>
+    <p:extLst>
+      <p:ext uri="{BB962C8B-B14F-4D97-AF65-F5344CB8AC3E}">
+        <p14:creationId xmlns:p14="http://schemas.microsoft.com/office/powerpoint/2010/main" val="2004725573"/>
+      </p:ext>
+    </p:extLst>
+  </p:cSld>
+  <p:clrMapOvr>
+    <a:masterClrMapping/>
+  </p:clrMapOvr>
+</p:sld>
+</file>
+
+<file path=ppt/slides/slide22.xml><?xml version="1.0" encoding="utf-8"?>
+<p:sld xmlns:a="http://schemas.openxmlformats.org/drawingml/2006/main" xmlns:r="http://schemas.openxmlformats.org/officeDocument/2006/relationships" xmlns:p="http://schemas.openxmlformats.org/presentationml/2006/main">
+  <p:cSld>
+    <p:spTree>
+      <p:nvGrpSpPr>
+        <p:cNvPr id="1" name=""/>
+        <p:cNvGrpSpPr/>
+        <p:nvPr/>
+      </p:nvGrpSpPr>
+      <p:grpSpPr>
+        <a:xfrm>
+          <a:off x="0" y="0"/>
+          <a:ext cx="0" cy="0"/>
+          <a:chOff x="0" y="0"/>
+          <a:chExt cx="0" cy="0"/>
+        </a:xfrm>
+      </p:grpSpPr>
+      <p:sp>
+        <p:nvSpPr>
+          <p:cNvPr id="2" name="Title 1"/>
+          <p:cNvSpPr>
+            <a:spLocks noGrp="1"/>
+          </p:cNvSpPr>
+          <p:nvPr>
+            <p:ph type="title"/>
+          </p:nvPr>
+        </p:nvSpPr>
+        <p:spPr/>
+        <p:txBody>
+          <a:bodyPr/>
+          <a:lstStyle/>
+          <a:p>
+            <a:r>
+              <a:rPr lang="en-US" dirty="0" smtClean="0"/>
+              <a:t>Conclusions</a:t>
+            </a:r>
+            <a:endParaRPr lang="en-US" dirty="0"/>
+          </a:p>
+        </p:txBody>
+      </p:sp>
+      <p:sp>
+        <p:nvSpPr>
+          <p:cNvPr id="3" name="Content Placeholder 2"/>
+          <p:cNvSpPr>
+            <a:spLocks noGrp="1"/>
+          </p:cNvSpPr>
+          <p:nvPr>
+            <p:ph idx="1"/>
+          </p:nvPr>
+        </p:nvSpPr>
+        <p:spPr/>
+        <p:txBody>
+          <a:bodyPr>
+            <a:normAutofit fontScale="92500" lnSpcReduction="20000"/>
+          </a:bodyPr>
+          <a:lstStyle/>
+          <a:p>
+            <a:r>
+              <a:rPr lang="en-US" dirty="0" smtClean="0"/>
+              <a:t>Web APIs impact the performance of the applications that depend on them.</a:t>
+            </a:r>
+          </a:p>
+          <a:p>
+            <a:r>
+              <a:rPr lang="en-US" dirty="0" smtClean="0"/>
+              <a:t>Cerebro provides a way to automatically predict response-time SLAs for APIs.</a:t>
+            </a:r>
+          </a:p>
+          <a:p>
+            <a:r>
+              <a:rPr lang="en-US" dirty="0" smtClean="0"/>
+              <a:t>We present a statistical model that can detect when a predicted SLA has become invalid. </a:t>
+            </a:r>
+          </a:p>
+          <a:p>
+            <a:r>
+              <a:rPr lang="en-US" dirty="0" smtClean="0"/>
+              <a:t>We extend Cerebro with a simple SLA acquisition and renewal model.</a:t>
+            </a:r>
+          </a:p>
+          <a:p>
+            <a:r>
+              <a:rPr lang="en-US" dirty="0" smtClean="0"/>
+              <a:t>We show that Cerebro predicted SLAs are highly durable, and the API consumers do not have to renew them too often.</a:t>
+            </a:r>
+            <a:endParaRPr lang="en-US" dirty="0"/>
+          </a:p>
+        </p:txBody>
+      </p:sp>
+    </p:spTree>
+    <p:extLst>
+      <p:ext uri="{BB962C8B-B14F-4D97-AF65-F5344CB8AC3E}">
+        <p14:creationId xmlns:p14="http://schemas.microsoft.com/office/powerpoint/2010/main" val="2346900357"/>
+      </p:ext>
+    </p:extLst>
+  </p:cSld>
+  <p:clrMapOvr>
+    <a:masterClrMapping/>
+  </p:clrMapOvr>
+</p:sld>
+</file>
+
 <file path=ppt/slides/slide3.xml><?xml version="1.0" encoding="utf-8"?>
 <p:sld xmlns:a="http://schemas.openxmlformats.org/drawingml/2006/main" xmlns:r="http://schemas.openxmlformats.org/officeDocument/2006/relationships" xmlns:p="http://schemas.openxmlformats.org/presentationml/2006/main">
   <p:cSld>
@@ -7265,13 +8221,8 @@
             <a:pPr algn="ctr"/>
             <a:r>
               <a:rPr lang="en-US" b="1" dirty="0" smtClean="0"/>
-              <a:t>Number of API Today: </a:t>
-            </a:r>
-            <a:r>
-              <a:rPr lang="en-US" b="1" dirty="0" smtClean="0"/>
-              <a:t>14,000+</a:t>
-            </a:r>
-            <a:endParaRPr lang="en-US" b="1" dirty="0" smtClean="0"/>
+              <a:t>Number of API Today: 14,000+</a:t>
+            </a:r>
           </a:p>
           <a:p>
             <a:pPr algn="ctr"/>
@@ -7377,15 +8328,7 @@
           <a:p>
             <a:r>
               <a:rPr lang="en-US" dirty="0" smtClean="0"/>
-              <a:t>Web APIs </a:t>
-            </a:r>
-            <a:r>
-              <a:rPr lang="en-US" dirty="0" smtClean="0"/>
-              <a:t>as </a:t>
-            </a:r>
-            <a:r>
-              <a:rPr lang="en-US" dirty="0" smtClean="0"/>
-              <a:t>IT Resources</a:t>
+              <a:t>Web APIs as IT Resources</a:t>
             </a:r>
             <a:endParaRPr lang="en-US" dirty="0"/>
           </a:p>
@@ -8668,15 +9611,7 @@
             </a:r>
             <a:r>
               <a:rPr lang="en-US" i="1" dirty="0" smtClean="0"/>
-              <a:t>0 </a:t>
-            </a:r>
-            <a:r>
-              <a:rPr lang="en-US" i="1" dirty="0" smtClean="0"/>
-              <a:t>≤ </a:t>
-            </a:r>
-            <a:r>
-              <a:rPr lang="en-US" i="1" dirty="0" smtClean="0"/>
-              <a:t>p ≤ 100</a:t>
+              <a:t>0 ≤ p ≤ 100</a:t>
             </a:r>
             <a:r>
               <a:rPr lang="en-US" dirty="0" smtClean="0"/>
@@ -8883,7 +9818,15 @@
           <a:p>
             <a:r>
               <a:rPr lang="en-US" dirty="0" smtClean="0"/>
-              <a:t>Cloud platforms are high dynamic</a:t>
+              <a:t>Cloud platforms are </a:t>
+            </a:r>
+            <a:r>
+              <a:rPr lang="en-US" dirty="0" smtClean="0"/>
+              <a:t>highly </a:t>
+            </a:r>
+            <a:r>
+              <a:rPr lang="en-US" dirty="0" smtClean="0"/>
+              <a:t>dynamic</a:t>
             </a:r>
           </a:p>
           <a:p>
@@ -8894,11 +9837,32 @@
           </a:p>
           <a:p>
             <a:r>
-              <a:rPr lang="en-US" dirty="0" smtClean="0"/>
-              <a:t>SLA validity period: the time period until a predicted SLA no longer holds correct</a:t>
-            </a:r>
-          </a:p>
-          <a:p>
+              <a:rPr lang="en-US" b="1" dirty="0" smtClean="0"/>
+              <a:t>SLA validity period:</a:t>
+            </a:r>
+            <a:r>
+              <a:rPr lang="en-US" dirty="0" smtClean="0"/>
+              <a:t> the time period until a predicted SLA </a:t>
+            </a:r>
+            <a:r>
+              <a:rPr lang="en-US" dirty="0" smtClean="0"/>
+              <a:t>can no </a:t>
+            </a:r>
+            <a:r>
+              <a:rPr lang="en-US" dirty="0" smtClean="0"/>
+              <a:t>longer </a:t>
+            </a:r>
+            <a:r>
+              <a:rPr lang="en-US" dirty="0" smtClean="0"/>
+              <a:t>be considered </a:t>
+            </a:r>
+            <a:r>
+              <a:rPr lang="en-US" dirty="0" smtClean="0"/>
+              <a:t>correct</a:t>
+            </a:r>
+          </a:p>
+          <a:p>
+            <a:pPr lvl="1"/>
             <a:r>
               <a:rPr lang="en-US" dirty="0" smtClean="0"/>
               <a:t>Ideally we want predicted SLAs to have long validity periods</a:t>

</xml_diff>